<commit_message>
Define moment of PulseSequence gradients
</commit_message>
<xml_diff>
--- a/Presentations/2023-05-22_ForwardModel_Summary.pptx
+++ b/Presentations/2023-05-22_ForwardModel_Summary.pptx
@@ -209,7 +209,7 @@
           <a:p>
             <a:fld id="{EB36D165-6B7B-034E-B016-BC4EC7F389F7}" type="datetimeFigureOut">
               <a:rPr lang="en-US" smtClean="0"/>
-              <a:t>5/22/23</a:t>
+              <a:t>5/24/23</a:t>
             </a:fld>
             <a:endParaRPr lang="en-US"/>
           </a:p>
@@ -623,7 +623,7 @@
           <a:p>
             <a:fld id="{B5759F77-1A77-DD41-A486-55781507BE30}" type="datetime1">
               <a:rPr lang="en-US" smtClean="0"/>
-              <a:t>5/22/23</a:t>
+              <a:t>5/24/23</a:t>
             </a:fld>
             <a:endParaRPr lang="en-US"/>
           </a:p>
@@ -821,7 +821,7 @@
           <a:p>
             <a:fld id="{A25AFF7F-AC89-DD4F-82B7-389D8E03E76E}" type="datetime1">
               <a:rPr lang="en-US" smtClean="0"/>
-              <a:t>5/22/23</a:t>
+              <a:t>5/24/23</a:t>
             </a:fld>
             <a:endParaRPr lang="en-US"/>
           </a:p>
@@ -1029,7 +1029,7 @@
           <a:p>
             <a:fld id="{511F4F2B-2DFA-664F-977B-CB775BD5F9FA}" type="datetime1">
               <a:rPr lang="en-US" smtClean="0"/>
-              <a:t>5/22/23</a:t>
+              <a:t>5/24/23</a:t>
             </a:fld>
             <a:endParaRPr lang="en-US"/>
           </a:p>
@@ -1228,7 +1228,7 @@
           <a:p>
             <a:fld id="{16A66F8D-479E-1F4E-BC6D-68FB1A6A8E03}" type="datetime1">
               <a:rPr lang="en-US" smtClean="0"/>
-              <a:t>5/22/23</a:t>
+              <a:t>5/24/23</a:t>
             </a:fld>
             <a:endParaRPr lang="en-US"/>
           </a:p>
@@ -1503,7 +1503,7 @@
           <a:p>
             <a:fld id="{0EA8C89D-10C9-6F48-AE44-96377291AF5A}" type="datetime1">
               <a:rPr lang="en-US" smtClean="0"/>
-              <a:t>5/22/23</a:t>
+              <a:t>5/24/23</a:t>
             </a:fld>
             <a:endParaRPr lang="en-US"/>
           </a:p>
@@ -1768,7 +1768,7 @@
           <a:p>
             <a:fld id="{42985C1D-D562-5946-8C96-B63312FF7EE7}" type="datetime1">
               <a:rPr lang="en-US" smtClean="0"/>
-              <a:t>5/22/23</a:t>
+              <a:t>5/24/23</a:t>
             </a:fld>
             <a:endParaRPr lang="en-US"/>
           </a:p>
@@ -2180,7 +2180,7 @@
           <a:p>
             <a:fld id="{04835F5F-C733-1440-99D9-6779A8A0FAA2}" type="datetime1">
               <a:rPr lang="en-US" smtClean="0"/>
-              <a:t>5/22/23</a:t>
+              <a:t>5/24/23</a:t>
             </a:fld>
             <a:endParaRPr lang="en-US"/>
           </a:p>
@@ -2321,7 +2321,7 @@
           <a:p>
             <a:fld id="{745140C9-7736-9847-81B5-BAAB2BBBF42F}" type="datetime1">
               <a:rPr lang="en-US" smtClean="0"/>
-              <a:t>5/22/23</a:t>
+              <a:t>5/24/23</a:t>
             </a:fld>
             <a:endParaRPr lang="en-US"/>
           </a:p>
@@ -2434,7 +2434,7 @@
           <a:p>
             <a:fld id="{FF70C7A5-4E0B-EA4C-B13B-1D62925319F8}" type="datetime1">
               <a:rPr lang="en-US" smtClean="0"/>
-              <a:t>5/22/23</a:t>
+              <a:t>5/24/23</a:t>
             </a:fld>
             <a:endParaRPr lang="en-US"/>
           </a:p>
@@ -2745,7 +2745,7 @@
           <a:p>
             <a:fld id="{3FD53D2F-A663-DD4D-96B2-DFA1EFAB733A}" type="datetime1">
               <a:rPr lang="en-US" smtClean="0"/>
-              <a:t>5/22/23</a:t>
+              <a:t>5/24/23</a:t>
             </a:fld>
             <a:endParaRPr lang="en-US"/>
           </a:p>
@@ -3036,7 +3036,7 @@
           <a:p>
             <a:fld id="{917CFD3D-2FCD-9D48-BF64-BF0A83EC4686}" type="datetime1">
               <a:rPr lang="en-US" smtClean="0"/>
-              <a:t>5/22/23</a:t>
+              <a:t>5/24/23</a:t>
             </a:fld>
             <a:endParaRPr lang="en-US"/>
           </a:p>
@@ -3277,7 +3277,7 @@
           <a:p>
             <a:fld id="{70EFC6CA-C81B-8540-9CDF-B0E28EBA130F}" type="datetime1">
               <a:rPr lang="en-US" smtClean="0"/>
-              <a:t>5/22/23</a:t>
+              <a:t>5/24/23</a:t>
             </a:fld>
             <a:endParaRPr lang="en-US"/>
           </a:p>
@@ -3745,9 +3745,10 @@
           <a:lstStyle/>
           <a:p>
             <a:r>
-              <a:rPr lang="en-US" dirty="0"/>
-              <a:t>Updated 2023-05-22</a:t>
-            </a:r>
+              <a:rPr lang="en-US"/>
+              <a:t>Updated 2023-05-24</a:t>
+            </a:r>
+            <a:endParaRPr lang="en-US" dirty="0"/>
           </a:p>
           <a:p>
             <a:r>
@@ -3844,8 +3845,8 @@
           </a:p>
         </p:txBody>
       </p:sp>
-      <mc:AlternateContent xmlns:mc="http://schemas.openxmlformats.org/markup-compatibility/2006">
-        <mc:Choice xmlns:a14="http://schemas.microsoft.com/office/drawing/2010/main" Requires="a14">
+      <mc:AlternateContent xmlns:mc="http://schemas.openxmlformats.org/markup-compatibility/2006" xmlns:a14="http://schemas.microsoft.com/office/drawing/2010/main">
+        <mc:Choice Requires="a14">
           <p:sp>
             <p:nvSpPr>
               <p:cNvPr id="3" name="Content Placeholder 2">
@@ -4796,7 +4797,16 @@
                                       <a:rPr lang="en-US" b="0" i="0" smtClean="0">
                                         <a:latin typeface="Cambria Math" panose="02040503050406030204" pitchFamily="18" charset="0"/>
                                       </a:rPr>
-                                      <m:t>cos</m:t>
+                                      <m:t>c</m:t>
+                                    </m:r>
+                                    <m:r>
+                                      <m:rPr>
+                                        <m:sty m:val="p"/>
+                                      </m:rPr>
+                                      <a:rPr lang="en-US" b="0" i="0" smtClean="0">
+                                        <a:latin typeface="Cambria Math" panose="02040503050406030204" pitchFamily="18" charset="0"/>
+                                      </a:rPr>
+                                      <m:t>os</m:t>
                                     </m:r>
                                   </m:fName>
                                   <m:e>
@@ -6675,7 +6685,7 @@
             </p:txBody>
           </p:sp>
         </mc:Choice>
-        <mc:Fallback>
+        <mc:Fallback xmlns="">
           <p:sp>
             <p:nvSpPr>
               <p:cNvPr id="3" name="Content Placeholder 2">
@@ -7777,8 +7787,8 @@
           </a:p>
         </p:txBody>
       </p:sp>
-      <mc:AlternateContent xmlns:mc="http://schemas.openxmlformats.org/markup-compatibility/2006">
-        <mc:Choice xmlns:a14="http://schemas.microsoft.com/office/drawing/2010/main" Requires="a14">
+      <mc:AlternateContent xmlns:mc="http://schemas.openxmlformats.org/markup-compatibility/2006" xmlns:a14="http://schemas.microsoft.com/office/drawing/2010/main">
+        <mc:Choice Requires="a14">
           <p:sp>
             <p:nvSpPr>
               <p:cNvPr id="3" name="Content Placeholder 2">
@@ -8696,7 +8706,7 @@
             </p:txBody>
           </p:sp>
         </mc:Choice>
-        <mc:Fallback>
+        <mc:Fallback xmlns="">
           <p:sp>
             <p:nvSpPr>
               <p:cNvPr id="3" name="Content Placeholder 2">
@@ -8823,8 +8833,8 @@
           </a:p>
         </p:txBody>
       </p:sp>
-      <mc:AlternateContent xmlns:mc="http://schemas.openxmlformats.org/markup-compatibility/2006">
-        <mc:Choice xmlns:a14="http://schemas.microsoft.com/office/drawing/2010/main" Requires="a14">
+      <mc:AlternateContent xmlns:mc="http://schemas.openxmlformats.org/markup-compatibility/2006" xmlns:a14="http://schemas.microsoft.com/office/drawing/2010/main">
+        <mc:Choice Requires="a14">
           <p:sp>
             <p:nvSpPr>
               <p:cNvPr id="3" name="Content Placeholder 2">
@@ -9705,7 +9715,7 @@
             </p:txBody>
           </p:sp>
         </mc:Choice>
-        <mc:Fallback>
+        <mc:Fallback xmlns="">
           <p:sp>
             <p:nvSpPr>
               <p:cNvPr id="3" name="Content Placeholder 2">
@@ -9832,8 +9842,8 @@
           </a:p>
         </p:txBody>
       </p:sp>
-      <mc:AlternateContent xmlns:mc="http://schemas.openxmlformats.org/markup-compatibility/2006">
-        <mc:Choice xmlns:a14="http://schemas.microsoft.com/office/drawing/2010/main" Requires="a14">
+      <mc:AlternateContent xmlns:mc="http://schemas.openxmlformats.org/markup-compatibility/2006" xmlns:a14="http://schemas.microsoft.com/office/drawing/2010/main">
+        <mc:Choice Requires="a14">
           <p:sp>
             <p:nvSpPr>
               <p:cNvPr id="3" name="Content Placeholder 2">
@@ -10428,13 +10438,7 @@
                                     <a:rPr lang="en-US" i="1">
                                       <a:latin typeface="Cambria Math" panose="02040503050406030204" pitchFamily="18" charset="0"/>
                                     </a:rPr>
-                                    <m:t>1</m:t>
-                                  </m:r>
-                                  <m:r>
-                                    <a:rPr lang="en-US" i="1">
-                                      <a:latin typeface="Cambria Math" panose="02040503050406030204" pitchFamily="18" charset="0"/>
-                                    </a:rPr>
-                                    <m:t>,</m:t>
+                                    <m:t>1,</m:t>
                                   </m:r>
                                   <m:r>
                                     <a:rPr lang="en-US" b="0" i="1" smtClean="0">
@@ -10807,7 +10811,7 @@
             </p:txBody>
           </p:sp>
         </mc:Choice>
-        <mc:Fallback>
+        <mc:Fallback xmlns="">
           <p:sp>
             <p:nvSpPr>
               <p:cNvPr id="3" name="Content Placeholder 2">
@@ -11211,13 +11215,7 @@
                                     <a:rPr lang="en-US" i="1">
                                       <a:latin typeface="Cambria Math" panose="02040503050406030204" pitchFamily="18" charset="0"/>
                                     </a:rPr>
-                                    <m:t>1</m:t>
-                                  </m:r>
-                                  <m:r>
-                                    <a:rPr lang="en-US" i="1">
-                                      <a:latin typeface="Cambria Math" panose="02040503050406030204" pitchFamily="18" charset="0"/>
-                                    </a:rPr>
-                                    <m:t>,</m:t>
+                                    <m:t>1,</m:t>
                                   </m:r>
                                   <m:r>
                                     <a:rPr lang="en-US" i="1">
@@ -11640,38 +11638,33 @@
                               </m:ctrlPr>
                             </m:eqArrPr>
                             <m:e>
-                              <m:sSub>
-                                <m:sSubPr>
+                              <m:r>
+                                <a:rPr lang="en-US" i="1">
+                                  <a:latin typeface="Cambria Math" panose="02040503050406030204" pitchFamily="18" charset="0"/>
+                                </a:rPr>
+                                <m:t>(1+</m:t>
+                              </m:r>
+                              <m:r>
+                                <a:rPr lang="en-US" i="1">
+                                  <a:latin typeface="Cambria Math" panose="02040503050406030204" pitchFamily="18" charset="0"/>
+                                </a:rPr>
+                                <m:t>𝛿</m:t>
+                              </m:r>
+                              <m:r>
+                                <a:rPr lang="en-US" i="1">
+                                  <a:latin typeface="Cambria Math" panose="02040503050406030204" pitchFamily="18" charset="0"/>
+                                </a:rPr>
+                                <m:t>)</m:t>
+                              </m:r>
+                              <m:sSubSup>
+                                <m:sSubSupPr>
                                   <m:ctrlPr>
                                     <a:rPr lang="en-US" i="1">
                                       <a:latin typeface="Cambria Math" panose="02040503050406030204" pitchFamily="18" charset="0"/>
                                     </a:rPr>
                                   </m:ctrlPr>
-                                </m:sSubPr>
+                                </m:sSubSupPr>
                                 <m:e>
-                                  <m:d>
-                                    <m:dPr>
-                                      <m:ctrlPr>
-                                        <a:rPr lang="en-US" b="0" i="1" smtClean="0">
-                                          <a:latin typeface="Cambria Math" panose="02040503050406030204" pitchFamily="18" charset="0"/>
-                                        </a:rPr>
-                                      </m:ctrlPr>
-                                    </m:dPr>
-                                    <m:e>
-                                      <m:r>
-                                        <a:rPr lang="en-US" b="0" i="1" smtClean="0">
-                                          <a:latin typeface="Cambria Math" panose="02040503050406030204" pitchFamily="18" charset="0"/>
-                                        </a:rPr>
-                                        <m:t>1+</m:t>
-                                      </m:r>
-                                      <m:r>
-                                        <a:rPr lang="en-US" b="0" i="1" smtClean="0">
-                                          <a:latin typeface="Cambria Math" panose="02040503050406030204" pitchFamily="18" charset="0"/>
-                                        </a:rPr>
-                                        <m:t>𝛿</m:t>
-                                      </m:r>
-                                    </m:e>
-                                  </m:d>
                                   <m:r>
                                     <a:rPr lang="en-US" i="1">
                                       <a:latin typeface="Cambria Math" panose="02040503050406030204" pitchFamily="18" charset="0"/>
@@ -11693,7 +11686,15 @@
                                     <m:t>𝑥</m:t>
                                   </m:r>
                                 </m:sub>
-                              </m:sSub>
+                                <m:sup>
+                                  <m:r>
+                                    <a:rPr lang="en-US" i="1">
+                                      <a:latin typeface="Cambria Math" panose="02040503050406030204" pitchFamily="18" charset="0"/>
+                                    </a:rPr>
+                                    <m:t>𝑒</m:t>
+                                  </m:r>
+                                </m:sup>
+                              </m:sSubSup>
                               <m:sSubSup>
                                 <m:sSubSupPr>
                                   <m:ctrlPr>
@@ -11732,37 +11733,32 @@
                               </m:sSubSup>
                             </m:e>
                             <m:e>
-                              <m:d>
-                                <m:dPr>
-                                  <m:ctrlPr>
-                                    <a:rPr lang="en-US" b="0" i="1" smtClean="0">
-                                      <a:latin typeface="Cambria Math" panose="02040503050406030204" pitchFamily="18" charset="0"/>
-                                    </a:rPr>
-                                  </m:ctrlPr>
-                                </m:dPr>
-                                <m:e>
-                                  <m:r>
-                                    <a:rPr lang="en-US" b="0" i="1" smtClean="0">
-                                      <a:latin typeface="Cambria Math" panose="02040503050406030204" pitchFamily="18" charset="0"/>
-                                    </a:rPr>
-                                    <m:t>1+</m:t>
-                                  </m:r>
-                                  <m:r>
-                                    <a:rPr lang="en-US" b="0" i="1" smtClean="0">
-                                      <a:latin typeface="Cambria Math" panose="02040503050406030204" pitchFamily="18" charset="0"/>
-                                    </a:rPr>
-                                    <m:t>𝛿</m:t>
-                                  </m:r>
-                                </m:e>
-                              </m:d>
-                              <m:sSub>
-                                <m:sSubPr>
+                              <m:r>
+                                <a:rPr lang="en-US" i="1">
+                                  <a:latin typeface="Cambria Math" panose="02040503050406030204" pitchFamily="18" charset="0"/>
+                                </a:rPr>
+                                <m:t>(1+</m:t>
+                              </m:r>
+                              <m:r>
+                                <a:rPr lang="en-US" i="1">
+                                  <a:latin typeface="Cambria Math" panose="02040503050406030204" pitchFamily="18" charset="0"/>
+                                </a:rPr>
+                                <m:t>𝛿</m:t>
+                              </m:r>
+                              <m:r>
+                                <a:rPr lang="en-US" i="1">
+                                  <a:latin typeface="Cambria Math" panose="02040503050406030204" pitchFamily="18" charset="0"/>
+                                </a:rPr>
+                                <m:t>)</m:t>
+                              </m:r>
+                              <m:sSubSup>
+                                <m:sSubSupPr>
                                   <m:ctrlPr>
                                     <a:rPr lang="en-US" i="1">
                                       <a:latin typeface="Cambria Math" panose="02040503050406030204" pitchFamily="18" charset="0"/>
                                     </a:rPr>
                                   </m:ctrlPr>
-                                </m:sSubPr>
+                                </m:sSubSupPr>
                                 <m:e>
                                   <m:r>
                                     <a:rPr lang="en-US" i="1">
@@ -11779,13 +11775,21 @@
                                     <m:t>1,</m:t>
                                   </m:r>
                                   <m:r>
-                                    <a:rPr lang="en-US" i="1">
+                                    <a:rPr lang="en-US" b="0" i="1" smtClean="0">
                                       <a:latin typeface="Cambria Math" panose="02040503050406030204" pitchFamily="18" charset="0"/>
                                     </a:rPr>
                                     <m:t>𝑦</m:t>
                                   </m:r>
                                 </m:sub>
-                              </m:sSub>
+                                <m:sup>
+                                  <m:r>
+                                    <a:rPr lang="en-US" i="1">
+                                      <a:latin typeface="Cambria Math" panose="02040503050406030204" pitchFamily="18" charset="0"/>
+                                    </a:rPr>
+                                    <m:t>𝑒</m:t>
+                                  </m:r>
+                                </m:sup>
+                              </m:sSubSup>
                               <m:sSubSup>
                                 <m:sSubSupPr>
                                   <m:ctrlPr>
@@ -12546,7 +12550,7 @@
               <a:blipFill>
                 <a:blip r:embed="rId2"/>
                 <a:stretch>
-                  <a:fillRect l="-555" t="-713" b="-1188"/>
+                  <a:fillRect l="-555" t="-713" b="-1425"/>
                 </a:stretch>
               </a:blipFill>
             </p:spPr>
@@ -12773,8 +12777,8 @@
           </a:p>
         </p:txBody>
       </p:sp>
-      <mc:AlternateContent xmlns:mc="http://schemas.openxmlformats.org/markup-compatibility/2006">
-        <mc:Choice xmlns:a14="http://schemas.microsoft.com/office/drawing/2010/main" Requires="a14">
+      <mc:AlternateContent xmlns:mc="http://schemas.openxmlformats.org/markup-compatibility/2006" xmlns:a14="http://schemas.microsoft.com/office/drawing/2010/main">
+        <mc:Choice Requires="a14">
           <p:sp>
             <p:nvSpPr>
               <p:cNvPr id="3" name="Content Placeholder 2">
@@ -14044,7 +14048,7 @@
             </p:txBody>
           </p:sp>
         </mc:Choice>
-        <mc:Fallback>
+        <mc:Fallback xmlns="">
           <p:sp>
             <p:nvSpPr>
               <p:cNvPr id="3" name="Content Placeholder 2">

</xml_diff>